<commit_message>
more EV3 Classroom Lessons
</commit_message>
<xml_diff>
--- a/en/ProgrammingLessons/beginner/scratch-Comments.pptx
+++ b/en/ProgrammingLessons/beginner/scratch-Comments.pptx
@@ -218,7 +218,7 @@
           <a:p>
             <a:fld id="{F8D9B3D7-15CB-9343-AA49-EFB5A8F33F18}" type="datetimeFigureOut">
               <a:rPr lang="en-US" smtClean="0"/>
-              <a:t>12/21/19</a:t>
+              <a:t>12/25/19</a:t>
             </a:fld>
             <a:endParaRPr lang="en-US"/>
           </a:p>
@@ -384,7 +384,7 @@
           <a:p>
             <a:fld id="{FD3EFF1E-85A1-6640-AFB9-C38833E80A84}" type="datetimeFigureOut">
               <a:rPr lang="en-US" smtClean="0"/>
-              <a:t>12/21/19</a:t>
+              <a:t>12/25/19</a:t>
             </a:fld>
             <a:endParaRPr lang="en-US"/>
           </a:p>
@@ -1706,35 +1706,6 @@
           </a:p>
         </p:txBody>
       </p:sp>
-      <p:pic>
-        <p:nvPicPr>
-          <p:cNvPr id="19" name="Picture 18" descr="A picture containing drawing&#10;&#10;Description automatically generated">
-            <a:extLst>
-              <a:ext uri="{FF2B5EF4-FFF2-40B4-BE49-F238E27FC236}">
-                <a16:creationId xmlns:a16="http://schemas.microsoft.com/office/drawing/2014/main" id="{EBBAF9A7-FD15-7A45-8CC9-0CA3D67FCBAD}"/>
-              </a:ext>
-            </a:extLst>
-          </p:cNvPr>
-          <p:cNvPicPr>
-            <a:picLocks noChangeAspect="1"/>
-          </p:cNvPicPr>
-          <p:nvPr userDrawn="1"/>
-        </p:nvPicPr>
-        <p:blipFill rotWithShape="1">
-          <a:blip r:embed="rId2"/>
-          <a:srcRect l="1617" t="7031" r="4033" b="8124"/>
-          <a:stretch/>
-        </p:blipFill>
-        <p:spPr>
-          <a:xfrm>
-            <a:off x="89513" y="25985"/>
-            <a:ext cx="8627349" cy="3250097"/>
-          </a:xfrm>
-          <a:prstGeom prst="rect">
-            <a:avLst/>
-          </a:prstGeom>
-        </p:spPr>
-      </p:pic>
     </p:spTree>
     <p:extLst>
       <p:ext uri="{BB962C8B-B14F-4D97-AF65-F5344CB8AC3E}">
@@ -7868,45 +7839,113 @@
         </p:nvSpPr>
         <p:spPr/>
         <p:txBody>
-          <a:bodyPr/>
-          <a:lstStyle/>
-          <a:p>
-            <a:r>
-              <a:rPr lang="en-US" dirty="0"/>
-              <a:t>Good Coding Practices: Using Comments</a:t>
-            </a:r>
-          </a:p>
-        </p:txBody>
-      </p:sp>
-      <p:sp>
-        <p:nvSpPr>
-          <p:cNvPr id="3" name="Title 2"/>
-          <p:cNvSpPr>
-            <a:spLocks noGrp="1"/>
-          </p:cNvSpPr>
-          <p:nvPr>
-            <p:ph type="ctrTitle"/>
-          </p:nvPr>
-        </p:nvSpPr>
-        <p:spPr/>
-        <p:txBody>
-          <a:bodyPr/>
-          <a:lstStyle/>
-          <a:p>
-            <a:pPr algn="ctr"/>
-            <a:r>
-              <a:rPr lang="en-US" dirty="0"/>
+          <a:bodyPr>
+            <a:normAutofit/>
+          </a:bodyPr>
+          <a:lstStyle/>
+          <a:p>
+            <a:r>
+              <a:rPr lang="en-US" sz="2400" dirty="0"/>
+              <a:t>EV3 </a:t>
+            </a:r>
+            <a:r>
+              <a:rPr lang="en-US" sz="2400" dirty="0" err="1"/>
+              <a:t>Classoom</a:t>
+            </a:r>
+            <a:r>
+              <a:rPr lang="en-US" sz="2400" dirty="0"/>
+              <a:t>: Using Comments</a:t>
+            </a:r>
+          </a:p>
+        </p:txBody>
+      </p:sp>
+      <p:sp>
+        <p:nvSpPr>
+          <p:cNvPr id="7" name="Title 1">
+            <a:extLst>
+              <a:ext uri="{FF2B5EF4-FFF2-40B4-BE49-F238E27FC236}">
+                <a16:creationId xmlns:a16="http://schemas.microsoft.com/office/drawing/2014/main" id="{38235447-03FA-A849-ACA0-6D703B56E48D}"/>
+              </a:ext>
+            </a:extLst>
+          </p:cNvPr>
+          <p:cNvSpPr txBox="1">
+            <a:spLocks/>
+          </p:cNvSpPr>
+          <p:nvPr/>
+        </p:nvSpPr>
+        <p:spPr>
+          <a:xfrm>
+            <a:off x="4868091" y="272833"/>
+            <a:ext cx="3897684" cy="1598052"/>
+          </a:xfrm>
+          <a:prstGeom prst="rect">
+            <a:avLst/>
+          </a:prstGeom>
+        </p:spPr>
+        <p:txBody>
+          <a:bodyPr vert="horz" lIns="91440" tIns="45720" rIns="91440" bIns="45720" rtlCol="0" anchor="t" anchorCtr="0">
+            <a:noAutofit/>
+          </a:bodyPr>
+          <a:lstStyle>
+            <a:lvl1pPr algn="l" defTabSz="914400" rtl="0" eaLnBrk="1" latinLnBrk="0" hangingPunct="1">
+              <a:spcBef>
+                <a:spcPct val="0"/>
+              </a:spcBef>
+              <a:buNone/>
+              <a:defRPr sz="2800" kern="1200" cap="all" spc="-60" baseline="0">
+                <a:solidFill>
+                  <a:schemeClr val="tx2"/>
+                </a:solidFill>
+                <a:latin typeface="+mj-lt"/>
+                <a:ea typeface="+mj-ea"/>
+                <a:cs typeface="+mj-cs"/>
+              </a:defRPr>
+            </a:lvl1pPr>
+          </a:lstStyle>
+          <a:p>
+            <a:r>
+              <a:rPr lang="en-US" sz="3200"/>
               <a:t>BEGINNER PROGRAMMING LESSON</a:t>
             </a:r>
+            <a:endParaRPr lang="en-US" sz="3200" dirty="0"/>
           </a:p>
         </p:txBody>
       </p:sp>
       <p:pic>
         <p:nvPicPr>
-          <p:cNvPr id="5" name="Picture 4" descr="A close up of a sign&#10;&#10;Description automatically generated">
+          <p:cNvPr id="8" name="Picture 7" descr="A picture containing drawing&#10;&#10;Description automatically generated">
             <a:extLst>
               <a:ext uri="{FF2B5EF4-FFF2-40B4-BE49-F238E27FC236}">
-                <a16:creationId xmlns:a16="http://schemas.microsoft.com/office/drawing/2014/main" id="{FA4672BC-0EEF-5E4C-96EF-9E1B518E0110}"/>
+                <a16:creationId xmlns:a16="http://schemas.microsoft.com/office/drawing/2014/main" id="{B5E9E6B4-D2FE-2A4E-A102-B09F885217B9}"/>
+              </a:ext>
+            </a:extLst>
+          </p:cNvPr>
+          <p:cNvPicPr>
+            <a:picLocks noChangeAspect="1"/>
+          </p:cNvPicPr>
+          <p:nvPr/>
+        </p:nvPicPr>
+        <p:blipFill rotWithShape="1">
+          <a:blip r:embed="rId3"/>
+          <a:srcRect l="1617" t="7031" r="4033" b="8124"/>
+          <a:stretch/>
+        </p:blipFill>
+        <p:spPr>
+          <a:xfrm>
+            <a:off x="129863" y="209018"/>
+            <a:ext cx="4442137" cy="1673443"/>
+          </a:xfrm>
+          <a:prstGeom prst="rect">
+            <a:avLst/>
+          </a:prstGeom>
+        </p:spPr>
+      </p:pic>
+      <p:pic>
+        <p:nvPicPr>
+          <p:cNvPr id="9" name="Picture 8" descr="A close up of a sign&#10;&#10;Description automatically generated">
+            <a:extLst>
+              <a:ext uri="{FF2B5EF4-FFF2-40B4-BE49-F238E27FC236}">
+                <a16:creationId xmlns:a16="http://schemas.microsoft.com/office/drawing/2014/main" id="{A03FE75E-DA1B-1240-AE52-58584FB91A63}"/>
               </a:ext>
             </a:extLst>
           </p:cNvPr>
@@ -7916,15 +7955,21 @@
           <p:nvPr/>
         </p:nvPicPr>
         <p:blipFill>
-          <a:blip r:embed="rId3"/>
+          <a:blip r:embed="rId4">
+            <a:extLst>
+              <a:ext uri="{28A0092B-C50C-407E-A947-70E740481C1C}">
+                <a14:useLocalDpi xmlns:a14="http://schemas.microsoft.com/office/drawing/2010/main" val="0"/>
+              </a:ext>
+            </a:extLst>
+          </a:blip>
           <a:stretch>
             <a:fillRect/>
           </a:stretch>
         </p:blipFill>
         <p:spPr>
-          <a:xfrm rot="905751">
-            <a:off x="7371419" y="387218"/>
-            <a:ext cx="1124670" cy="1101589"/>
+          <a:xfrm>
+            <a:off x="3730120" y="4883748"/>
+            <a:ext cx="1444298" cy="1444298"/>
           </a:xfrm>
           <a:prstGeom prst="rect">
             <a:avLst/>

</xml_diff>